<commit_message>
Finished the status report document for the Control System. This also included the addition of media and references relevant to the report.
</commit_message>
<xml_diff>
--- a/Documentation/Media/Figures.pptx
+++ b/Documentation/Media/Figures.pptx
@@ -254,7 +254,7 @@
           <a:p>
             <a:fld id="{4133ACA0-FD16-4565-B620-AFEA77AFE3E9}" type="datetimeFigureOut">
               <a:rPr lang="en-US" smtClean="0"/>
-              <a:t>6/1/2016</a:t>
+              <a:t>6/2/2016</a:t>
             </a:fld>
             <a:endParaRPr lang="en-US"/>
           </a:p>
@@ -424,7 +424,7 @@
           <a:p>
             <a:fld id="{4133ACA0-FD16-4565-B620-AFEA77AFE3E9}" type="datetimeFigureOut">
               <a:rPr lang="en-US" smtClean="0"/>
-              <a:t>6/1/2016</a:t>
+              <a:t>6/2/2016</a:t>
             </a:fld>
             <a:endParaRPr lang="en-US"/>
           </a:p>
@@ -604,7 +604,7 @@
           <a:p>
             <a:fld id="{4133ACA0-FD16-4565-B620-AFEA77AFE3E9}" type="datetimeFigureOut">
               <a:rPr lang="en-US" smtClean="0"/>
-              <a:t>6/1/2016</a:t>
+              <a:t>6/2/2016</a:t>
             </a:fld>
             <a:endParaRPr lang="en-US"/>
           </a:p>
@@ -774,7 +774,7 @@
           <a:p>
             <a:fld id="{4133ACA0-FD16-4565-B620-AFEA77AFE3E9}" type="datetimeFigureOut">
               <a:rPr lang="en-US" smtClean="0"/>
-              <a:t>6/1/2016</a:t>
+              <a:t>6/2/2016</a:t>
             </a:fld>
             <a:endParaRPr lang="en-US"/>
           </a:p>
@@ -1020,7 +1020,7 @@
           <a:p>
             <a:fld id="{4133ACA0-FD16-4565-B620-AFEA77AFE3E9}" type="datetimeFigureOut">
               <a:rPr lang="en-US" smtClean="0"/>
-              <a:t>6/1/2016</a:t>
+              <a:t>6/2/2016</a:t>
             </a:fld>
             <a:endParaRPr lang="en-US"/>
           </a:p>
@@ -1252,7 +1252,7 @@
           <a:p>
             <a:fld id="{4133ACA0-FD16-4565-B620-AFEA77AFE3E9}" type="datetimeFigureOut">
               <a:rPr lang="en-US" smtClean="0"/>
-              <a:t>6/1/2016</a:t>
+              <a:t>6/2/2016</a:t>
             </a:fld>
             <a:endParaRPr lang="en-US"/>
           </a:p>
@@ -1619,7 +1619,7 @@
           <a:p>
             <a:fld id="{4133ACA0-FD16-4565-B620-AFEA77AFE3E9}" type="datetimeFigureOut">
               <a:rPr lang="en-US" smtClean="0"/>
-              <a:t>6/1/2016</a:t>
+              <a:t>6/2/2016</a:t>
             </a:fld>
             <a:endParaRPr lang="en-US"/>
           </a:p>
@@ -1737,7 +1737,7 @@
           <a:p>
             <a:fld id="{4133ACA0-FD16-4565-B620-AFEA77AFE3E9}" type="datetimeFigureOut">
               <a:rPr lang="en-US" smtClean="0"/>
-              <a:t>6/1/2016</a:t>
+              <a:t>6/2/2016</a:t>
             </a:fld>
             <a:endParaRPr lang="en-US"/>
           </a:p>
@@ -1832,7 +1832,7 @@
           <a:p>
             <a:fld id="{4133ACA0-FD16-4565-B620-AFEA77AFE3E9}" type="datetimeFigureOut">
               <a:rPr lang="en-US" smtClean="0"/>
-              <a:t>6/1/2016</a:t>
+              <a:t>6/2/2016</a:t>
             </a:fld>
             <a:endParaRPr lang="en-US"/>
           </a:p>
@@ -2109,7 +2109,7 @@
           <a:p>
             <a:fld id="{4133ACA0-FD16-4565-B620-AFEA77AFE3E9}" type="datetimeFigureOut">
               <a:rPr lang="en-US" smtClean="0"/>
-              <a:t>6/1/2016</a:t>
+              <a:t>6/2/2016</a:t>
             </a:fld>
             <a:endParaRPr lang="en-US"/>
           </a:p>
@@ -2362,7 +2362,7 @@
           <a:p>
             <a:fld id="{4133ACA0-FD16-4565-B620-AFEA77AFE3E9}" type="datetimeFigureOut">
               <a:rPr lang="en-US" smtClean="0"/>
-              <a:t>6/1/2016</a:t>
+              <a:t>6/2/2016</a:t>
             </a:fld>
             <a:endParaRPr lang="en-US"/>
           </a:p>
@@ -2575,7 +2575,7 @@
           <a:p>
             <a:fld id="{4133ACA0-FD16-4565-B620-AFEA77AFE3E9}" type="datetimeFigureOut">
               <a:rPr lang="en-US" smtClean="0"/>
-              <a:t>6/1/2016</a:t>
+              <a:t>6/2/2016</a:t>
             </a:fld>
             <a:endParaRPr lang="en-US"/>
           </a:p>
@@ -2980,142 +2980,46 @@
           <a:chExt cx="0" cy="0"/>
         </a:xfrm>
       </p:grpSpPr>
-      <p:sp>
-        <p:nvSpPr>
-          <p:cNvPr id="4" name="Rounded Rectangle 3"/>
-          <p:cNvSpPr/>
-          <p:nvPr/>
-        </p:nvSpPr>
-        <p:spPr>
-          <a:xfrm>
-            <a:off x="4898379" y="1447800"/>
-            <a:ext cx="2395242" cy="777509"/>
-          </a:xfrm>
-          <a:prstGeom prst="roundRect">
-            <a:avLst/>
-          </a:prstGeom>
-        </p:spPr>
-        <p:style>
-          <a:lnRef idx="2">
-            <a:schemeClr val="accent6">
-              <a:shade val="50000"/>
-            </a:schemeClr>
-          </a:lnRef>
-          <a:fillRef idx="1">
-            <a:schemeClr val="accent6"/>
-          </a:fillRef>
-          <a:effectRef idx="0">
-            <a:schemeClr val="accent6"/>
-          </a:effectRef>
-          <a:fontRef idx="minor">
-            <a:schemeClr val="lt1"/>
-          </a:fontRef>
-        </p:style>
-        <p:txBody>
-          <a:bodyPr rtlCol="0" anchor="ctr"/>
-          <a:lstStyle/>
-          <a:p>
-            <a:pPr algn="ctr"/>
-            <a:r>
-              <a:rPr lang="en-US" dirty="0" smtClean="0"/>
-              <a:t>Control System</a:t>
-            </a:r>
-            <a:endParaRPr lang="en-US" dirty="0"/>
-          </a:p>
-        </p:txBody>
-      </p:sp>
-      <p:sp>
-        <p:nvSpPr>
-          <p:cNvPr id="5" name="Rounded Rectangle 4"/>
-          <p:cNvSpPr/>
-          <p:nvPr/>
-        </p:nvSpPr>
-        <p:spPr>
-          <a:xfrm>
-            <a:off x="2000082" y="3461639"/>
-            <a:ext cx="2183298" cy="601103"/>
-          </a:xfrm>
-          <a:prstGeom prst="roundRect">
-            <a:avLst/>
-          </a:prstGeom>
-        </p:spPr>
-        <p:style>
-          <a:lnRef idx="2">
-            <a:schemeClr val="accent5">
-              <a:shade val="50000"/>
-            </a:schemeClr>
-          </a:lnRef>
-          <a:fillRef idx="1">
-            <a:schemeClr val="accent5"/>
-          </a:fillRef>
-          <a:effectRef idx="0">
-            <a:schemeClr val="accent5"/>
-          </a:effectRef>
-          <a:fontRef idx="minor">
-            <a:schemeClr val="lt1"/>
-          </a:fontRef>
-        </p:style>
-        <p:txBody>
-          <a:bodyPr rtlCol="0" anchor="ctr"/>
-          <a:lstStyle/>
-          <a:p>
-            <a:pPr algn="ctr"/>
-            <a:r>
-              <a:rPr lang="en-US" sz="1600" dirty="0" smtClean="0"/>
-              <a:t>Smart Instrument #1</a:t>
-            </a:r>
-            <a:endParaRPr lang="en-US" sz="1600" dirty="0"/>
-          </a:p>
-        </p:txBody>
-      </p:sp>
       <p:grpSp>
         <p:nvGrpSpPr>
-          <p:cNvPr id="11" name="Group 10"/>
+          <p:cNvPr id="18" name="Group 17"/>
           <p:cNvGrpSpPr/>
           <p:nvPr/>
         </p:nvGrpSpPr>
         <p:grpSpPr>
           <a:xfrm>
-            <a:off x="8014168" y="3692395"/>
-            <a:ext cx="606902" cy="139589"/>
-            <a:chOff x="8156772" y="3673782"/>
-            <a:chExt cx="606902" cy="139589"/>
+            <a:off x="1963901" y="1187368"/>
+            <a:ext cx="6477188" cy="5233560"/>
+            <a:chOff x="1963901" y="1187368"/>
+            <a:chExt cx="6477188" cy="5233560"/>
           </a:xfrm>
         </p:grpSpPr>
         <p:sp>
           <p:nvSpPr>
-            <p:cNvPr id="8" name="Oval 7"/>
+            <p:cNvPr id="4" name="Rounded Rectangle 3"/>
             <p:cNvSpPr/>
             <p:nvPr/>
           </p:nvSpPr>
           <p:spPr>
             <a:xfrm>
-              <a:off x="8156772" y="3673784"/>
-              <a:ext cx="129472" cy="139587"/>
+              <a:off x="4898379" y="1447800"/>
+              <a:ext cx="2395242" cy="777509"/>
             </a:xfrm>
-            <a:prstGeom prst="ellipse">
+            <a:prstGeom prst="roundRect">
               <a:avLst/>
             </a:prstGeom>
-            <a:solidFill>
-              <a:srgbClr val="FF0000"/>
-            </a:solidFill>
-            <a:ln>
-              <a:solidFill>
-                <a:schemeClr val="tx1"/>
-              </a:solidFill>
-            </a:ln>
           </p:spPr>
           <p:style>
             <a:lnRef idx="2">
-              <a:schemeClr val="accent1">
+              <a:schemeClr val="accent6">
                 <a:shade val="50000"/>
               </a:schemeClr>
             </a:lnRef>
             <a:fillRef idx="1">
-              <a:schemeClr val="accent1"/>
+              <a:schemeClr val="accent6"/>
             </a:fillRef>
             <a:effectRef idx="0">
-              <a:schemeClr val="accent1"/>
+              <a:schemeClr val="accent6"/>
             </a:effectRef>
             <a:fontRef idx="minor">
               <a:schemeClr val="lt1"/>
@@ -3126,44 +3030,40 @@
             <a:lstStyle/>
             <a:p>
               <a:pPr algn="ctr"/>
-              <a:endParaRPr lang="en-US"/>
+              <a:r>
+                <a:rPr lang="en-US" dirty="0" smtClean="0"/>
+                <a:t>Control System</a:t>
+              </a:r>
+              <a:endParaRPr lang="en-US" dirty="0"/>
             </a:p>
           </p:txBody>
         </p:sp>
         <p:sp>
           <p:nvSpPr>
-            <p:cNvPr id="9" name="Oval 8"/>
+            <p:cNvPr id="5" name="Rounded Rectangle 4"/>
             <p:cNvSpPr/>
             <p:nvPr/>
           </p:nvSpPr>
           <p:spPr>
             <a:xfrm>
-              <a:off x="8395487" y="3673783"/>
-              <a:ext cx="129472" cy="139587"/>
+              <a:off x="2000082" y="3461639"/>
+              <a:ext cx="2183298" cy="601103"/>
             </a:xfrm>
-            <a:prstGeom prst="ellipse">
+            <a:prstGeom prst="roundRect">
               <a:avLst/>
             </a:prstGeom>
-            <a:solidFill>
-              <a:srgbClr val="FF0000"/>
-            </a:solidFill>
-            <a:ln>
-              <a:solidFill>
-                <a:schemeClr val="tx1"/>
-              </a:solidFill>
-            </a:ln>
           </p:spPr>
           <p:style>
             <a:lnRef idx="2">
-              <a:schemeClr val="accent1">
+              <a:schemeClr val="accent5">
                 <a:shade val="50000"/>
               </a:schemeClr>
             </a:lnRef>
             <a:fillRef idx="1">
-              <a:schemeClr val="accent1"/>
+              <a:schemeClr val="accent5"/>
             </a:fillRef>
             <a:effectRef idx="0">
-              <a:schemeClr val="accent1"/>
+              <a:schemeClr val="accent5"/>
             </a:effectRef>
             <a:fontRef idx="minor">
               <a:schemeClr val="lt1"/>
@@ -3174,44 +3074,199 @@
             <a:lstStyle/>
             <a:p>
               <a:pPr algn="ctr"/>
-              <a:endParaRPr lang="en-US"/>
+              <a:r>
+                <a:rPr lang="en-US" sz="1600" dirty="0" smtClean="0"/>
+                <a:t>Smart Instrument #1</a:t>
+              </a:r>
+              <a:endParaRPr lang="en-US" sz="1600" dirty="0"/>
             </a:p>
           </p:txBody>
         </p:sp>
+        <p:grpSp>
+          <p:nvGrpSpPr>
+            <p:cNvPr id="11" name="Group 10"/>
+            <p:cNvGrpSpPr/>
+            <p:nvPr/>
+          </p:nvGrpSpPr>
+          <p:grpSpPr>
+            <a:xfrm>
+              <a:off x="7834187" y="3692395"/>
+              <a:ext cx="606902" cy="139589"/>
+              <a:chOff x="8156772" y="3673782"/>
+              <a:chExt cx="606902" cy="139589"/>
+            </a:xfrm>
+          </p:grpSpPr>
+          <p:sp>
+            <p:nvSpPr>
+              <p:cNvPr id="8" name="Oval 7"/>
+              <p:cNvSpPr/>
+              <p:nvPr/>
+            </p:nvSpPr>
+            <p:spPr>
+              <a:xfrm>
+                <a:off x="8156772" y="3673784"/>
+                <a:ext cx="129472" cy="139587"/>
+              </a:xfrm>
+              <a:prstGeom prst="ellipse">
+                <a:avLst/>
+              </a:prstGeom>
+              <a:solidFill>
+                <a:srgbClr val="FF0000"/>
+              </a:solidFill>
+              <a:ln>
+                <a:solidFill>
+                  <a:schemeClr val="tx1"/>
+                </a:solidFill>
+              </a:ln>
+            </p:spPr>
+            <p:style>
+              <a:lnRef idx="2">
+                <a:schemeClr val="accent1">
+                  <a:shade val="50000"/>
+                </a:schemeClr>
+              </a:lnRef>
+              <a:fillRef idx="1">
+                <a:schemeClr val="accent1"/>
+              </a:fillRef>
+              <a:effectRef idx="0">
+                <a:schemeClr val="accent1"/>
+              </a:effectRef>
+              <a:fontRef idx="minor">
+                <a:schemeClr val="lt1"/>
+              </a:fontRef>
+            </p:style>
+            <p:txBody>
+              <a:bodyPr rtlCol="0" anchor="ctr"/>
+              <a:lstStyle/>
+              <a:p>
+                <a:pPr algn="ctr"/>
+                <a:endParaRPr lang="en-US"/>
+              </a:p>
+            </p:txBody>
+          </p:sp>
+          <p:sp>
+            <p:nvSpPr>
+              <p:cNvPr id="9" name="Oval 8"/>
+              <p:cNvSpPr/>
+              <p:nvPr/>
+            </p:nvSpPr>
+            <p:spPr>
+              <a:xfrm>
+                <a:off x="8395487" y="3673783"/>
+                <a:ext cx="129472" cy="139587"/>
+              </a:xfrm>
+              <a:prstGeom prst="ellipse">
+                <a:avLst/>
+              </a:prstGeom>
+              <a:solidFill>
+                <a:srgbClr val="FF0000"/>
+              </a:solidFill>
+              <a:ln>
+                <a:solidFill>
+                  <a:schemeClr val="tx1"/>
+                </a:solidFill>
+              </a:ln>
+            </p:spPr>
+            <p:style>
+              <a:lnRef idx="2">
+                <a:schemeClr val="accent1">
+                  <a:shade val="50000"/>
+                </a:schemeClr>
+              </a:lnRef>
+              <a:fillRef idx="1">
+                <a:schemeClr val="accent1"/>
+              </a:fillRef>
+              <a:effectRef idx="0">
+                <a:schemeClr val="accent1"/>
+              </a:effectRef>
+              <a:fontRef idx="minor">
+                <a:schemeClr val="lt1"/>
+              </a:fontRef>
+            </p:style>
+            <p:txBody>
+              <a:bodyPr rtlCol="0" anchor="ctr"/>
+              <a:lstStyle/>
+              <a:p>
+                <a:pPr algn="ctr"/>
+                <a:endParaRPr lang="en-US"/>
+              </a:p>
+            </p:txBody>
+          </p:sp>
+          <p:sp>
+            <p:nvSpPr>
+              <p:cNvPr id="10" name="Oval 9"/>
+              <p:cNvSpPr/>
+              <p:nvPr/>
+            </p:nvSpPr>
+            <p:spPr>
+              <a:xfrm>
+                <a:off x="8634202" y="3673782"/>
+                <a:ext cx="129472" cy="139587"/>
+              </a:xfrm>
+              <a:prstGeom prst="ellipse">
+                <a:avLst/>
+              </a:prstGeom>
+              <a:solidFill>
+                <a:srgbClr val="FF0000"/>
+              </a:solidFill>
+              <a:ln>
+                <a:solidFill>
+                  <a:schemeClr val="tx1"/>
+                </a:solidFill>
+              </a:ln>
+            </p:spPr>
+            <p:style>
+              <a:lnRef idx="2">
+                <a:schemeClr val="accent1">
+                  <a:shade val="50000"/>
+                </a:schemeClr>
+              </a:lnRef>
+              <a:fillRef idx="1">
+                <a:schemeClr val="accent1"/>
+              </a:fillRef>
+              <a:effectRef idx="0">
+                <a:schemeClr val="accent1"/>
+              </a:effectRef>
+              <a:fontRef idx="minor">
+                <a:schemeClr val="lt1"/>
+              </a:fontRef>
+            </p:style>
+            <p:txBody>
+              <a:bodyPr rtlCol="0" anchor="ctr"/>
+              <a:lstStyle/>
+              <a:p>
+                <a:pPr algn="ctr"/>
+                <a:endParaRPr lang="en-US"/>
+              </a:p>
+            </p:txBody>
+          </p:sp>
+        </p:grpSp>
         <p:sp>
           <p:nvSpPr>
-            <p:cNvPr id="10" name="Oval 9"/>
+            <p:cNvPr id="24" name="Rounded Rectangle 23"/>
             <p:cNvSpPr/>
             <p:nvPr/>
           </p:nvSpPr>
           <p:spPr>
             <a:xfrm>
-              <a:off x="8634202" y="3673782"/>
-              <a:ext cx="129472" cy="139587"/>
+              <a:off x="1963901" y="4884344"/>
+              <a:ext cx="880278" cy="578243"/>
             </a:xfrm>
-            <a:prstGeom prst="ellipse">
+            <a:prstGeom prst="roundRect">
               <a:avLst/>
             </a:prstGeom>
-            <a:solidFill>
-              <a:srgbClr val="FF0000"/>
-            </a:solidFill>
-            <a:ln>
-              <a:solidFill>
-                <a:schemeClr val="tx1"/>
-              </a:solidFill>
-            </a:ln>
           </p:spPr>
           <p:style>
             <a:lnRef idx="2">
-              <a:schemeClr val="accent1">
+              <a:schemeClr val="dk1">
                 <a:shade val="50000"/>
               </a:schemeClr>
             </a:lnRef>
             <a:fillRef idx="1">
-              <a:schemeClr val="accent1"/>
+              <a:schemeClr val="dk1"/>
             </a:fillRef>
             <a:effectRef idx="0">
-              <a:schemeClr val="accent1"/>
+              <a:schemeClr val="dk1"/>
             </a:effectRef>
             <a:fontRef idx="minor">
               <a:schemeClr val="lt1"/>
@@ -3222,877 +3277,957 @@
             <a:lstStyle/>
             <a:p>
               <a:pPr algn="ctr"/>
-              <a:endParaRPr lang="en-US"/>
+              <a:r>
+                <a:rPr lang="en-US" sz="1200" dirty="0" smtClean="0"/>
+                <a:t>Sensor #1</a:t>
+              </a:r>
+              <a:endParaRPr lang="en-US" sz="1200" dirty="0"/>
             </a:p>
           </p:txBody>
         </p:sp>
+        <p:sp>
+          <p:nvSpPr>
+            <p:cNvPr id="31" name="Rounded Rectangle 30"/>
+            <p:cNvSpPr/>
+            <p:nvPr/>
+          </p:nvSpPr>
+          <p:spPr>
+            <a:xfrm>
+              <a:off x="2651592" y="5648288"/>
+              <a:ext cx="880278" cy="578243"/>
+            </a:xfrm>
+            <a:prstGeom prst="roundRect">
+              <a:avLst/>
+            </a:prstGeom>
+          </p:spPr>
+          <p:style>
+            <a:lnRef idx="2">
+              <a:schemeClr val="dk1">
+                <a:shade val="50000"/>
+              </a:schemeClr>
+            </a:lnRef>
+            <a:fillRef idx="1">
+              <a:schemeClr val="dk1"/>
+            </a:fillRef>
+            <a:effectRef idx="0">
+              <a:schemeClr val="dk1"/>
+            </a:effectRef>
+            <a:fontRef idx="minor">
+              <a:schemeClr val="lt1"/>
+            </a:fontRef>
+          </p:style>
+          <p:txBody>
+            <a:bodyPr rtlCol="0" anchor="ctr"/>
+            <a:lstStyle/>
+            <a:p>
+              <a:pPr algn="ctr"/>
+              <a:r>
+                <a:rPr lang="en-US" sz="1200" dirty="0" smtClean="0"/>
+                <a:t>Sensor #2</a:t>
+              </a:r>
+              <a:endParaRPr lang="en-US" sz="1200" dirty="0"/>
+            </a:p>
+          </p:txBody>
+        </p:sp>
+        <p:sp>
+          <p:nvSpPr>
+            <p:cNvPr id="32" name="Rounded Rectangle 31"/>
+            <p:cNvSpPr/>
+            <p:nvPr/>
+          </p:nvSpPr>
+          <p:spPr>
+            <a:xfrm>
+              <a:off x="3409224" y="4750163"/>
+              <a:ext cx="880278" cy="578243"/>
+            </a:xfrm>
+            <a:prstGeom prst="roundRect">
+              <a:avLst/>
+            </a:prstGeom>
+          </p:spPr>
+          <p:style>
+            <a:lnRef idx="2">
+              <a:schemeClr val="dk1">
+                <a:shade val="50000"/>
+              </a:schemeClr>
+            </a:lnRef>
+            <a:fillRef idx="1">
+              <a:schemeClr val="dk1"/>
+            </a:fillRef>
+            <a:effectRef idx="0">
+              <a:schemeClr val="dk1"/>
+            </a:effectRef>
+            <a:fontRef idx="minor">
+              <a:schemeClr val="lt1"/>
+            </a:fontRef>
+          </p:style>
+          <p:txBody>
+            <a:bodyPr rtlCol="0" anchor="ctr"/>
+            <a:lstStyle/>
+            <a:p>
+              <a:pPr algn="ctr"/>
+              <a:r>
+                <a:rPr lang="en-US" sz="1200" dirty="0" smtClean="0"/>
+                <a:t>Sensor #3</a:t>
+              </a:r>
+              <a:endParaRPr lang="en-US" sz="1200" dirty="0"/>
+            </a:p>
+          </p:txBody>
+        </p:sp>
+        <p:sp>
+          <p:nvSpPr>
+            <p:cNvPr id="49" name="Rounded Rectangle 48"/>
+            <p:cNvSpPr/>
+            <p:nvPr/>
+          </p:nvSpPr>
+          <p:spPr>
+            <a:xfrm>
+              <a:off x="5007125" y="3461639"/>
+              <a:ext cx="2183298" cy="601103"/>
+            </a:xfrm>
+            <a:prstGeom prst="roundRect">
+              <a:avLst/>
+            </a:prstGeom>
+          </p:spPr>
+          <p:style>
+            <a:lnRef idx="2">
+              <a:schemeClr val="accent5">
+                <a:shade val="50000"/>
+              </a:schemeClr>
+            </a:lnRef>
+            <a:fillRef idx="1">
+              <a:schemeClr val="accent5"/>
+            </a:fillRef>
+            <a:effectRef idx="0">
+              <a:schemeClr val="accent5"/>
+            </a:effectRef>
+            <a:fontRef idx="minor">
+              <a:schemeClr val="lt1"/>
+            </a:fontRef>
+          </p:style>
+          <p:txBody>
+            <a:bodyPr rtlCol="0" anchor="ctr"/>
+            <a:lstStyle/>
+            <a:p>
+              <a:pPr algn="ctr"/>
+              <a:r>
+                <a:rPr lang="en-US" sz="1600" dirty="0" smtClean="0"/>
+                <a:t>Smart Instrument #2</a:t>
+              </a:r>
+              <a:endParaRPr lang="en-US" sz="1600" dirty="0"/>
+            </a:p>
+          </p:txBody>
+        </p:sp>
+        <p:sp>
+          <p:nvSpPr>
+            <p:cNvPr id="50" name="Rounded Rectangle 49"/>
+            <p:cNvSpPr/>
+            <p:nvPr/>
+          </p:nvSpPr>
+          <p:spPr>
+            <a:xfrm>
+              <a:off x="4970944" y="4884344"/>
+              <a:ext cx="880278" cy="578243"/>
+            </a:xfrm>
+            <a:prstGeom prst="roundRect">
+              <a:avLst/>
+            </a:prstGeom>
+          </p:spPr>
+          <p:style>
+            <a:lnRef idx="2">
+              <a:schemeClr val="dk1">
+                <a:shade val="50000"/>
+              </a:schemeClr>
+            </a:lnRef>
+            <a:fillRef idx="1">
+              <a:schemeClr val="dk1"/>
+            </a:fillRef>
+            <a:effectRef idx="0">
+              <a:schemeClr val="dk1"/>
+            </a:effectRef>
+            <a:fontRef idx="minor">
+              <a:schemeClr val="lt1"/>
+            </a:fontRef>
+          </p:style>
+          <p:txBody>
+            <a:bodyPr rtlCol="0" anchor="ctr"/>
+            <a:lstStyle/>
+            <a:p>
+              <a:pPr algn="ctr"/>
+              <a:r>
+                <a:rPr lang="en-US" sz="1200" dirty="0" smtClean="0"/>
+                <a:t>Sensor #4</a:t>
+              </a:r>
+              <a:endParaRPr lang="en-US" sz="1200" dirty="0"/>
+            </a:p>
+          </p:txBody>
+        </p:sp>
+        <p:sp>
+          <p:nvSpPr>
+            <p:cNvPr id="51" name="Rounded Rectangle 50"/>
+            <p:cNvSpPr/>
+            <p:nvPr/>
+          </p:nvSpPr>
+          <p:spPr>
+            <a:xfrm>
+              <a:off x="5655861" y="5842685"/>
+              <a:ext cx="880278" cy="578243"/>
+            </a:xfrm>
+            <a:prstGeom prst="roundRect">
+              <a:avLst/>
+            </a:prstGeom>
+          </p:spPr>
+          <p:style>
+            <a:lnRef idx="2">
+              <a:schemeClr val="dk1">
+                <a:shade val="50000"/>
+              </a:schemeClr>
+            </a:lnRef>
+            <a:fillRef idx="1">
+              <a:schemeClr val="dk1"/>
+            </a:fillRef>
+            <a:effectRef idx="0">
+              <a:schemeClr val="dk1"/>
+            </a:effectRef>
+            <a:fontRef idx="minor">
+              <a:schemeClr val="lt1"/>
+            </a:fontRef>
+          </p:style>
+          <p:txBody>
+            <a:bodyPr rtlCol="0" anchor="ctr"/>
+            <a:lstStyle/>
+            <a:p>
+              <a:pPr algn="ctr"/>
+              <a:r>
+                <a:rPr lang="en-US" sz="1200" dirty="0" smtClean="0"/>
+                <a:t>Sensor #5</a:t>
+              </a:r>
+              <a:endParaRPr lang="en-US" sz="1200" dirty="0"/>
+            </a:p>
+          </p:txBody>
+        </p:sp>
+        <p:sp>
+          <p:nvSpPr>
+            <p:cNvPr id="52" name="Rounded Rectangle 51"/>
+            <p:cNvSpPr/>
+            <p:nvPr/>
+          </p:nvSpPr>
+          <p:spPr>
+            <a:xfrm>
+              <a:off x="6416267" y="4750163"/>
+              <a:ext cx="880278" cy="578243"/>
+            </a:xfrm>
+            <a:prstGeom prst="roundRect">
+              <a:avLst/>
+            </a:prstGeom>
+          </p:spPr>
+          <p:style>
+            <a:lnRef idx="2">
+              <a:schemeClr val="dk1">
+                <a:shade val="50000"/>
+              </a:schemeClr>
+            </a:lnRef>
+            <a:fillRef idx="1">
+              <a:schemeClr val="dk1"/>
+            </a:fillRef>
+            <a:effectRef idx="0">
+              <a:schemeClr val="dk1"/>
+            </a:effectRef>
+            <a:fontRef idx="minor">
+              <a:schemeClr val="lt1"/>
+            </a:fontRef>
+          </p:style>
+          <p:txBody>
+            <a:bodyPr rtlCol="0" anchor="ctr"/>
+            <a:lstStyle/>
+            <a:p>
+              <a:pPr algn="ctr"/>
+              <a:r>
+                <a:rPr lang="en-US" sz="1200" dirty="0" smtClean="0"/>
+                <a:t>Sensor #6</a:t>
+              </a:r>
+              <a:endParaRPr lang="en-US" sz="1200" dirty="0"/>
+            </a:p>
+          </p:txBody>
+        </p:sp>
+        <p:sp>
+          <p:nvSpPr>
+            <p:cNvPr id="64" name="Rounded Rectangle 63"/>
+            <p:cNvSpPr/>
+            <p:nvPr/>
+          </p:nvSpPr>
+          <p:spPr>
+            <a:xfrm>
+              <a:off x="6674084" y="5648287"/>
+              <a:ext cx="880278" cy="578243"/>
+            </a:xfrm>
+            <a:prstGeom prst="roundRect">
+              <a:avLst/>
+            </a:prstGeom>
+          </p:spPr>
+          <p:style>
+            <a:lnRef idx="2">
+              <a:schemeClr val="dk1">
+                <a:shade val="50000"/>
+              </a:schemeClr>
+            </a:lnRef>
+            <a:fillRef idx="1">
+              <a:schemeClr val="dk1"/>
+            </a:fillRef>
+            <a:effectRef idx="0">
+              <a:schemeClr val="dk1"/>
+            </a:effectRef>
+            <a:fontRef idx="minor">
+              <a:schemeClr val="lt1"/>
+            </a:fontRef>
+          </p:style>
+          <p:txBody>
+            <a:bodyPr rtlCol="0" anchor="ctr"/>
+            <a:lstStyle/>
+            <a:p>
+              <a:pPr algn="ctr"/>
+              <a:r>
+                <a:rPr lang="en-US" sz="1200" dirty="0" smtClean="0"/>
+                <a:t>Sensor #7</a:t>
+              </a:r>
+              <a:endParaRPr lang="en-US" sz="1200" dirty="0"/>
+            </a:p>
+          </p:txBody>
+        </p:sp>
+        <p:cxnSp>
+          <p:nvCxnSpPr>
+            <p:cNvPr id="91" name="Elbow Connector 90"/>
+            <p:cNvCxnSpPr>
+              <a:stCxn id="5" idx="2"/>
+              <a:endCxn id="24" idx="0"/>
+            </p:cNvCxnSpPr>
+            <p:nvPr/>
+          </p:nvCxnSpPr>
+          <p:spPr>
+            <a:xfrm rot="5400000">
+              <a:off x="2337085" y="4129698"/>
+              <a:ext cx="821602" cy="687691"/>
+            </a:xfrm>
+            <a:prstGeom prst="bentConnector3">
+              <a:avLst>
+                <a:gd name="adj1" fmla="val 50000"/>
+              </a:avLst>
+            </a:prstGeom>
+            <a:ln w="28575">
+              <a:solidFill>
+                <a:schemeClr val="tx1"/>
+              </a:solidFill>
+              <a:headEnd type="triangle"/>
+              <a:tailEnd type="triangle"/>
+            </a:ln>
+          </p:spPr>
+          <p:style>
+            <a:lnRef idx="1">
+              <a:schemeClr val="accent1"/>
+            </a:lnRef>
+            <a:fillRef idx="0">
+              <a:schemeClr val="accent1"/>
+            </a:fillRef>
+            <a:effectRef idx="0">
+              <a:schemeClr val="accent1"/>
+            </a:effectRef>
+            <a:fontRef idx="minor">
+              <a:schemeClr val="tx1"/>
+            </a:fontRef>
+          </p:style>
+        </p:cxnSp>
+        <p:cxnSp>
+          <p:nvCxnSpPr>
+            <p:cNvPr id="94" name="Elbow Connector 93"/>
+            <p:cNvCxnSpPr>
+              <a:stCxn id="5" idx="2"/>
+              <a:endCxn id="32" idx="0"/>
+            </p:cNvCxnSpPr>
+            <p:nvPr/>
+          </p:nvCxnSpPr>
+          <p:spPr>
+            <a:xfrm rot="16200000" flipH="1">
+              <a:off x="3126837" y="4027636"/>
+              <a:ext cx="687421" cy="757632"/>
+            </a:xfrm>
+            <a:prstGeom prst="bentConnector3">
+              <a:avLst>
+                <a:gd name="adj1" fmla="val 50000"/>
+              </a:avLst>
+            </a:prstGeom>
+            <a:ln w="28575">
+              <a:solidFill>
+                <a:schemeClr val="tx1"/>
+              </a:solidFill>
+              <a:headEnd type="triangle"/>
+              <a:tailEnd type="triangle"/>
+            </a:ln>
+          </p:spPr>
+          <p:style>
+            <a:lnRef idx="1">
+              <a:schemeClr val="accent1"/>
+            </a:lnRef>
+            <a:fillRef idx="0">
+              <a:schemeClr val="accent1"/>
+            </a:fillRef>
+            <a:effectRef idx="0">
+              <a:schemeClr val="accent1"/>
+            </a:effectRef>
+            <a:fontRef idx="minor">
+              <a:schemeClr val="tx1"/>
+            </a:fontRef>
+          </p:style>
+        </p:cxnSp>
+        <p:cxnSp>
+          <p:nvCxnSpPr>
+            <p:cNvPr id="97" name="Elbow Connector 96"/>
+            <p:cNvCxnSpPr>
+              <a:stCxn id="49" idx="2"/>
+              <a:endCxn id="64" idx="0"/>
+            </p:cNvCxnSpPr>
+            <p:nvPr/>
+          </p:nvCxnSpPr>
+          <p:spPr>
+            <a:xfrm rot="16200000" flipH="1">
+              <a:off x="5813726" y="4347789"/>
+              <a:ext cx="1585545" cy="1015449"/>
+            </a:xfrm>
+            <a:prstGeom prst="bentConnector3">
+              <a:avLst>
+                <a:gd name="adj1" fmla="val 85644"/>
+              </a:avLst>
+            </a:prstGeom>
+            <a:ln w="28575">
+              <a:solidFill>
+                <a:schemeClr val="tx1"/>
+              </a:solidFill>
+              <a:headEnd type="triangle"/>
+              <a:tailEnd type="triangle"/>
+            </a:ln>
+          </p:spPr>
+          <p:style>
+            <a:lnRef idx="1">
+              <a:schemeClr val="accent1"/>
+            </a:lnRef>
+            <a:fillRef idx="0">
+              <a:schemeClr val="accent1"/>
+            </a:fillRef>
+            <a:effectRef idx="0">
+              <a:schemeClr val="accent1"/>
+            </a:effectRef>
+            <a:fontRef idx="minor">
+              <a:schemeClr val="tx1"/>
+            </a:fontRef>
+          </p:style>
+        </p:cxnSp>
+        <p:cxnSp>
+          <p:nvCxnSpPr>
+            <p:cNvPr id="98" name="Elbow Connector 97"/>
+            <p:cNvCxnSpPr>
+              <a:stCxn id="49" idx="2"/>
+              <a:endCxn id="52" idx="0"/>
+            </p:cNvCxnSpPr>
+            <p:nvPr/>
+          </p:nvCxnSpPr>
+          <p:spPr>
+            <a:xfrm rot="16200000" flipH="1">
+              <a:off x="6133880" y="4027636"/>
+              <a:ext cx="687421" cy="757632"/>
+            </a:xfrm>
+            <a:prstGeom prst="bentConnector3">
+              <a:avLst>
+                <a:gd name="adj1" fmla="val 50000"/>
+              </a:avLst>
+            </a:prstGeom>
+            <a:ln w="28575">
+              <a:solidFill>
+                <a:schemeClr val="tx1"/>
+              </a:solidFill>
+              <a:headEnd type="triangle"/>
+              <a:tailEnd type="triangle"/>
+            </a:ln>
+          </p:spPr>
+          <p:style>
+            <a:lnRef idx="1">
+              <a:schemeClr val="accent1"/>
+            </a:lnRef>
+            <a:fillRef idx="0">
+              <a:schemeClr val="accent1"/>
+            </a:fillRef>
+            <a:effectRef idx="0">
+              <a:schemeClr val="accent1"/>
+            </a:effectRef>
+            <a:fontRef idx="minor">
+              <a:schemeClr val="tx1"/>
+            </a:fontRef>
+          </p:style>
+        </p:cxnSp>
+        <p:cxnSp>
+          <p:nvCxnSpPr>
+            <p:cNvPr id="99" name="Elbow Connector 98"/>
+            <p:cNvCxnSpPr>
+              <a:stCxn id="49" idx="2"/>
+              <a:endCxn id="50" idx="0"/>
+            </p:cNvCxnSpPr>
+            <p:nvPr/>
+          </p:nvCxnSpPr>
+          <p:spPr>
+            <a:xfrm rot="5400000">
+              <a:off x="5344128" y="4129698"/>
+              <a:ext cx="821602" cy="687691"/>
+            </a:xfrm>
+            <a:prstGeom prst="bentConnector3">
+              <a:avLst>
+                <a:gd name="adj1" fmla="val 50000"/>
+              </a:avLst>
+            </a:prstGeom>
+            <a:ln w="28575">
+              <a:solidFill>
+                <a:schemeClr val="tx1"/>
+              </a:solidFill>
+              <a:headEnd type="triangle"/>
+              <a:tailEnd type="triangle"/>
+            </a:ln>
+          </p:spPr>
+          <p:style>
+            <a:lnRef idx="1">
+              <a:schemeClr val="accent1"/>
+            </a:lnRef>
+            <a:fillRef idx="0">
+              <a:schemeClr val="accent1"/>
+            </a:fillRef>
+            <a:effectRef idx="0">
+              <a:schemeClr val="accent1"/>
+            </a:effectRef>
+            <a:fontRef idx="minor">
+              <a:schemeClr val="tx1"/>
+            </a:fontRef>
+          </p:style>
+        </p:cxnSp>
+        <p:cxnSp>
+          <p:nvCxnSpPr>
+            <p:cNvPr id="100" name="Elbow Connector 99"/>
+            <p:cNvCxnSpPr>
+              <a:stCxn id="4" idx="2"/>
+              <a:endCxn id="5" idx="0"/>
+            </p:cNvCxnSpPr>
+            <p:nvPr/>
+          </p:nvCxnSpPr>
+          <p:spPr>
+            <a:xfrm rot="5400000">
+              <a:off x="3975701" y="1341340"/>
+              <a:ext cx="1236330" cy="3004269"/>
+            </a:xfrm>
+            <a:prstGeom prst="bentConnector3">
+              <a:avLst>
+                <a:gd name="adj1" fmla="val 50000"/>
+              </a:avLst>
+            </a:prstGeom>
+            <a:ln w="28575">
+              <a:solidFill>
+                <a:schemeClr val="tx1"/>
+              </a:solidFill>
+              <a:headEnd type="triangle"/>
+              <a:tailEnd type="triangle"/>
+            </a:ln>
+          </p:spPr>
+          <p:style>
+            <a:lnRef idx="1">
+              <a:schemeClr val="accent1"/>
+            </a:lnRef>
+            <a:fillRef idx="0">
+              <a:schemeClr val="accent1"/>
+            </a:fillRef>
+            <a:effectRef idx="0">
+              <a:schemeClr val="accent1"/>
+            </a:effectRef>
+            <a:fontRef idx="minor">
+              <a:schemeClr val="tx1"/>
+            </a:fontRef>
+          </p:style>
+        </p:cxnSp>
+        <p:cxnSp>
+          <p:nvCxnSpPr>
+            <p:cNvPr id="111" name="Straight Arrow Connector 110"/>
+            <p:cNvCxnSpPr>
+              <a:stCxn id="4" idx="2"/>
+              <a:endCxn id="49" idx="0"/>
+            </p:cNvCxnSpPr>
+            <p:nvPr/>
+          </p:nvCxnSpPr>
+          <p:spPr>
+            <a:xfrm>
+              <a:off x="6096000" y="2225309"/>
+              <a:ext cx="2774" cy="1236330"/>
+            </a:xfrm>
+            <a:prstGeom prst="straightConnector1">
+              <a:avLst/>
+            </a:prstGeom>
+            <a:ln w="28575">
+              <a:solidFill>
+                <a:schemeClr val="tx1"/>
+              </a:solidFill>
+              <a:headEnd type="triangle"/>
+              <a:tailEnd type="triangle"/>
+            </a:ln>
+          </p:spPr>
+          <p:style>
+            <a:lnRef idx="1">
+              <a:schemeClr val="accent1"/>
+            </a:lnRef>
+            <a:fillRef idx="0">
+              <a:schemeClr val="accent1"/>
+            </a:fillRef>
+            <a:effectRef idx="0">
+              <a:schemeClr val="accent1"/>
+            </a:effectRef>
+            <a:fontRef idx="minor">
+              <a:schemeClr val="tx1"/>
+            </a:fontRef>
+          </p:style>
+        </p:cxnSp>
+        <p:cxnSp>
+          <p:nvCxnSpPr>
+            <p:cNvPr id="112" name="Straight Arrow Connector 111"/>
+            <p:cNvCxnSpPr>
+              <a:stCxn id="5" idx="2"/>
+              <a:endCxn id="31" idx="0"/>
+            </p:cNvCxnSpPr>
+            <p:nvPr/>
+          </p:nvCxnSpPr>
+          <p:spPr>
+            <a:xfrm>
+              <a:off x="3091731" y="4062742"/>
+              <a:ext cx="0" cy="1585546"/>
+            </a:xfrm>
+            <a:prstGeom prst="straightConnector1">
+              <a:avLst/>
+            </a:prstGeom>
+            <a:ln w="28575">
+              <a:solidFill>
+                <a:schemeClr val="tx1"/>
+              </a:solidFill>
+              <a:headEnd type="triangle"/>
+              <a:tailEnd type="triangle"/>
+            </a:ln>
+          </p:spPr>
+          <p:style>
+            <a:lnRef idx="1">
+              <a:schemeClr val="accent1"/>
+            </a:lnRef>
+            <a:fillRef idx="0">
+              <a:schemeClr val="accent1"/>
+            </a:fillRef>
+            <a:effectRef idx="0">
+              <a:schemeClr val="accent1"/>
+            </a:effectRef>
+            <a:fontRef idx="minor">
+              <a:schemeClr val="tx1"/>
+            </a:fontRef>
+          </p:style>
+        </p:cxnSp>
+        <p:cxnSp>
+          <p:nvCxnSpPr>
+            <p:cNvPr id="113" name="Straight Arrow Connector 112"/>
+            <p:cNvCxnSpPr>
+              <a:stCxn id="49" idx="2"/>
+              <a:endCxn id="51" idx="0"/>
+            </p:cNvCxnSpPr>
+            <p:nvPr/>
+          </p:nvCxnSpPr>
+          <p:spPr>
+            <a:xfrm flipH="1">
+              <a:off x="6096000" y="4062742"/>
+              <a:ext cx="2774" cy="1779943"/>
+            </a:xfrm>
+            <a:prstGeom prst="straightConnector1">
+              <a:avLst/>
+            </a:prstGeom>
+            <a:ln w="28575">
+              <a:solidFill>
+                <a:schemeClr val="tx1"/>
+              </a:solidFill>
+              <a:headEnd type="triangle"/>
+              <a:tailEnd type="triangle"/>
+            </a:ln>
+          </p:spPr>
+          <p:style>
+            <a:lnRef idx="1">
+              <a:schemeClr val="accent1"/>
+            </a:lnRef>
+            <a:fillRef idx="0">
+              <a:schemeClr val="accent1"/>
+            </a:fillRef>
+            <a:effectRef idx="0">
+              <a:schemeClr val="accent1"/>
+            </a:effectRef>
+            <a:fontRef idx="minor">
+              <a:schemeClr val="tx1"/>
+            </a:fontRef>
+          </p:style>
+        </p:cxnSp>
+        <p:sp>
+          <p:nvSpPr>
+            <p:cNvPr id="48" name="Oval 47"/>
+            <p:cNvSpPr/>
+            <p:nvPr/>
+          </p:nvSpPr>
+          <p:spPr>
+            <a:xfrm>
+              <a:off x="2802805" y="4257140"/>
+              <a:ext cx="577850" cy="375146"/>
+            </a:xfrm>
+            <a:prstGeom prst="ellipse">
+              <a:avLst/>
+            </a:prstGeom>
+          </p:spPr>
+          <p:style>
+            <a:lnRef idx="2">
+              <a:schemeClr val="dk1"/>
+            </a:lnRef>
+            <a:fillRef idx="1">
+              <a:schemeClr val="lt1"/>
+            </a:fillRef>
+            <a:effectRef idx="0">
+              <a:schemeClr val="dk1"/>
+            </a:effectRef>
+            <a:fontRef idx="minor">
+              <a:schemeClr val="dk1"/>
+            </a:fontRef>
+          </p:style>
+          <p:txBody>
+            <a:bodyPr rtlCol="0" anchor="ctr"/>
+            <a:lstStyle/>
+            <a:p>
+              <a:pPr algn="ctr"/>
+              <a:r>
+                <a:rPr lang="en-US" sz="1200" dirty="0" smtClean="0"/>
+                <a:t>I</a:t>
+              </a:r>
+              <a:r>
+                <a:rPr lang="en-US" sz="1200" baseline="30000" dirty="0" smtClean="0"/>
+                <a:t>2</a:t>
+              </a:r>
+              <a:r>
+                <a:rPr lang="en-US" sz="1200" dirty="0" smtClean="0"/>
+                <a:t>C</a:t>
+              </a:r>
+              <a:endParaRPr lang="en-US" sz="1200" dirty="0"/>
+            </a:p>
+          </p:txBody>
+        </p:sp>
+        <p:sp>
+          <p:nvSpPr>
+            <p:cNvPr id="78" name="Oval 77"/>
+            <p:cNvSpPr/>
+            <p:nvPr/>
+          </p:nvSpPr>
+          <p:spPr>
+            <a:xfrm>
+              <a:off x="5533699" y="2600110"/>
+              <a:ext cx="1140385" cy="477158"/>
+            </a:xfrm>
+            <a:prstGeom prst="ellipse">
+              <a:avLst/>
+            </a:prstGeom>
+          </p:spPr>
+          <p:style>
+            <a:lnRef idx="2">
+              <a:schemeClr val="dk1"/>
+            </a:lnRef>
+            <a:fillRef idx="1">
+              <a:schemeClr val="lt1"/>
+            </a:fillRef>
+            <a:effectRef idx="0">
+              <a:schemeClr val="dk1"/>
+            </a:effectRef>
+            <a:fontRef idx="minor">
+              <a:schemeClr val="dk1"/>
+            </a:fontRef>
+          </p:style>
+          <p:txBody>
+            <a:bodyPr rtlCol="0" anchor="ctr"/>
+            <a:lstStyle/>
+            <a:p>
+              <a:pPr algn="ctr"/>
+              <a:r>
+                <a:rPr lang="en-US" sz="1200" dirty="0" smtClean="0"/>
+                <a:t>Bluetooth</a:t>
+              </a:r>
+              <a:endParaRPr lang="en-US" sz="1200" dirty="0"/>
+            </a:p>
+          </p:txBody>
+        </p:sp>
+        <p:sp>
+          <p:nvSpPr>
+            <p:cNvPr id="56" name="Oval 55"/>
+            <p:cNvSpPr/>
+            <p:nvPr/>
+          </p:nvSpPr>
+          <p:spPr>
+            <a:xfrm>
+              <a:off x="5809848" y="4257140"/>
+              <a:ext cx="577850" cy="375146"/>
+            </a:xfrm>
+            <a:prstGeom prst="ellipse">
+              <a:avLst/>
+            </a:prstGeom>
+          </p:spPr>
+          <p:style>
+            <a:lnRef idx="2">
+              <a:schemeClr val="dk1"/>
+            </a:lnRef>
+            <a:fillRef idx="1">
+              <a:schemeClr val="lt1"/>
+            </a:fillRef>
+            <a:effectRef idx="0">
+              <a:schemeClr val="dk1"/>
+            </a:effectRef>
+            <a:fontRef idx="minor">
+              <a:schemeClr val="dk1"/>
+            </a:fontRef>
+          </p:style>
+          <p:txBody>
+            <a:bodyPr rtlCol="0" anchor="ctr"/>
+            <a:lstStyle/>
+            <a:p>
+              <a:pPr algn="ctr"/>
+              <a:r>
+                <a:rPr lang="en-US" sz="1200" dirty="0" smtClean="0"/>
+                <a:t>I</a:t>
+              </a:r>
+              <a:r>
+                <a:rPr lang="en-US" sz="1200" baseline="30000" dirty="0" smtClean="0"/>
+                <a:t>2</a:t>
+              </a:r>
+              <a:r>
+                <a:rPr lang="en-US" sz="1200" dirty="0" smtClean="0"/>
+                <a:t>C</a:t>
+              </a:r>
+              <a:endParaRPr lang="en-US" sz="1200" dirty="0"/>
+            </a:p>
+          </p:txBody>
+        </p:sp>
+        <p:sp>
+          <p:nvSpPr>
+            <p:cNvPr id="15" name="TextBox 14"/>
+            <p:cNvSpPr txBox="1"/>
+            <p:nvPr/>
+          </p:nvSpPr>
+          <p:spPr>
+            <a:xfrm>
+              <a:off x="2983429" y="2609680"/>
+              <a:ext cx="2350770" cy="276999"/>
+            </a:xfrm>
+            <a:prstGeom prst="rect">
+              <a:avLst/>
+            </a:prstGeom>
+            <a:noFill/>
+          </p:spPr>
+          <p:txBody>
+            <a:bodyPr wrap="square" rtlCol="0">
+              <a:spAutoFit/>
+            </a:bodyPr>
+            <a:lstStyle/>
+            <a:p>
+              <a:r>
+                <a:rPr lang="en-US" sz="1200" dirty="0" smtClean="0"/>
+                <a:t>Bidirectional Communication</a:t>
+              </a:r>
+              <a:endParaRPr lang="en-US" sz="1200" dirty="0"/>
+            </a:p>
+          </p:txBody>
+        </p:sp>
+        <p:pic>
+          <p:nvPicPr>
+            <p:cNvPr id="16" name="Picture 15"/>
+            <p:cNvPicPr>
+              <a:picLocks noChangeAspect="1"/>
+            </p:cNvPicPr>
+            <p:nvPr/>
+          </p:nvPicPr>
+          <p:blipFill>
+            <a:blip r:embed="rId2" cstate="print">
+              <a:extLst>
+                <a:ext uri="{28A0092B-C50C-407E-A947-70E740481C1C}">
+                  <a14:useLocalDpi xmlns:a14="http://schemas.microsoft.com/office/drawing/2010/main" val="0"/>
+                </a:ext>
+              </a:extLst>
+            </a:blip>
+            <a:stretch>
+              <a:fillRect/>
+            </a:stretch>
+          </p:blipFill>
+          <p:spPr>
+            <a:xfrm>
+              <a:off x="6919746" y="3198165"/>
+              <a:ext cx="520863" cy="520863"/>
+            </a:xfrm>
+            <a:prstGeom prst="rect">
+              <a:avLst/>
+            </a:prstGeom>
+          </p:spPr>
+        </p:pic>
+        <p:pic>
+          <p:nvPicPr>
+            <p:cNvPr id="17" name="Picture 16"/>
+            <p:cNvPicPr>
+              <a:picLocks noChangeAspect="1"/>
+            </p:cNvPicPr>
+            <p:nvPr/>
+          </p:nvPicPr>
+          <p:blipFill>
+            <a:blip r:embed="rId3" cstate="print">
+              <a:extLst>
+                <a:ext uri="{28A0092B-C50C-407E-A947-70E740481C1C}">
+                  <a14:useLocalDpi xmlns:a14="http://schemas.microsoft.com/office/drawing/2010/main" val="0"/>
+                </a:ext>
+              </a:extLst>
+            </a:blip>
+            <a:stretch>
+              <a:fillRect/>
+            </a:stretch>
+          </p:blipFill>
+          <p:spPr>
+            <a:xfrm>
+              <a:off x="7033189" y="1187368"/>
+              <a:ext cx="520863" cy="520863"/>
+            </a:xfrm>
+            <a:prstGeom prst="rect">
+              <a:avLst/>
+            </a:prstGeom>
+          </p:spPr>
+        </p:pic>
+        <p:pic>
+          <p:nvPicPr>
+            <p:cNvPr id="39" name="Picture 38"/>
+            <p:cNvPicPr>
+              <a:picLocks noChangeAspect="1"/>
+            </p:cNvPicPr>
+            <p:nvPr/>
+          </p:nvPicPr>
+          <p:blipFill>
+            <a:blip r:embed="rId2" cstate="print">
+              <a:extLst>
+                <a:ext uri="{28A0092B-C50C-407E-A947-70E740481C1C}">
+                  <a14:useLocalDpi xmlns:a14="http://schemas.microsoft.com/office/drawing/2010/main" val="0"/>
+                </a:ext>
+              </a:extLst>
+            </a:blip>
+            <a:stretch>
+              <a:fillRect/>
+            </a:stretch>
+          </p:blipFill>
+          <p:spPr>
+            <a:xfrm>
+              <a:off x="3898382" y="3198165"/>
+              <a:ext cx="520863" cy="520863"/>
+            </a:xfrm>
+            <a:prstGeom prst="rect">
+              <a:avLst/>
+            </a:prstGeom>
+          </p:spPr>
+        </p:pic>
       </p:grpSp>
-      <p:sp>
-        <p:nvSpPr>
-          <p:cNvPr id="24" name="Rounded Rectangle 23"/>
-          <p:cNvSpPr/>
-          <p:nvPr/>
-        </p:nvSpPr>
-        <p:spPr>
-          <a:xfrm>
-            <a:off x="1963901" y="4884344"/>
-            <a:ext cx="880278" cy="578243"/>
-          </a:xfrm>
-          <a:prstGeom prst="roundRect">
-            <a:avLst/>
-          </a:prstGeom>
-        </p:spPr>
-        <p:style>
-          <a:lnRef idx="2">
-            <a:schemeClr val="dk1">
-              <a:shade val="50000"/>
-            </a:schemeClr>
-          </a:lnRef>
-          <a:fillRef idx="1">
-            <a:schemeClr val="dk1"/>
-          </a:fillRef>
-          <a:effectRef idx="0">
-            <a:schemeClr val="dk1"/>
-          </a:effectRef>
-          <a:fontRef idx="minor">
-            <a:schemeClr val="lt1"/>
-          </a:fontRef>
-        </p:style>
-        <p:txBody>
-          <a:bodyPr rtlCol="0" anchor="ctr"/>
-          <a:lstStyle/>
-          <a:p>
-            <a:pPr algn="ctr"/>
-            <a:r>
-              <a:rPr lang="en-US" sz="1200" dirty="0" smtClean="0"/>
-              <a:t>Sensor #1</a:t>
-            </a:r>
-            <a:endParaRPr lang="en-US" sz="1200" dirty="0"/>
-          </a:p>
-        </p:txBody>
-      </p:sp>
-      <p:sp>
-        <p:nvSpPr>
-          <p:cNvPr id="31" name="Rounded Rectangle 30"/>
-          <p:cNvSpPr/>
-          <p:nvPr/>
-        </p:nvSpPr>
-        <p:spPr>
-          <a:xfrm>
-            <a:off x="2651592" y="5648288"/>
-            <a:ext cx="880278" cy="578243"/>
-          </a:xfrm>
-          <a:prstGeom prst="roundRect">
-            <a:avLst/>
-          </a:prstGeom>
-        </p:spPr>
-        <p:style>
-          <a:lnRef idx="2">
-            <a:schemeClr val="dk1">
-              <a:shade val="50000"/>
-            </a:schemeClr>
-          </a:lnRef>
-          <a:fillRef idx="1">
-            <a:schemeClr val="dk1"/>
-          </a:fillRef>
-          <a:effectRef idx="0">
-            <a:schemeClr val="dk1"/>
-          </a:effectRef>
-          <a:fontRef idx="minor">
-            <a:schemeClr val="lt1"/>
-          </a:fontRef>
-        </p:style>
-        <p:txBody>
-          <a:bodyPr rtlCol="0" anchor="ctr"/>
-          <a:lstStyle/>
-          <a:p>
-            <a:pPr algn="ctr"/>
-            <a:r>
-              <a:rPr lang="en-US" sz="1200" dirty="0" smtClean="0"/>
-              <a:t>Sensor #2</a:t>
-            </a:r>
-            <a:endParaRPr lang="en-US" sz="1200" dirty="0"/>
-          </a:p>
-        </p:txBody>
-      </p:sp>
-      <p:sp>
-        <p:nvSpPr>
-          <p:cNvPr id="32" name="Rounded Rectangle 31"/>
-          <p:cNvSpPr/>
-          <p:nvPr/>
-        </p:nvSpPr>
-        <p:spPr>
-          <a:xfrm>
-            <a:off x="3409224" y="4750163"/>
-            <a:ext cx="880278" cy="578243"/>
-          </a:xfrm>
-          <a:prstGeom prst="roundRect">
-            <a:avLst/>
-          </a:prstGeom>
-        </p:spPr>
-        <p:style>
-          <a:lnRef idx="2">
-            <a:schemeClr val="dk1">
-              <a:shade val="50000"/>
-            </a:schemeClr>
-          </a:lnRef>
-          <a:fillRef idx="1">
-            <a:schemeClr val="dk1"/>
-          </a:fillRef>
-          <a:effectRef idx="0">
-            <a:schemeClr val="dk1"/>
-          </a:effectRef>
-          <a:fontRef idx="minor">
-            <a:schemeClr val="lt1"/>
-          </a:fontRef>
-        </p:style>
-        <p:txBody>
-          <a:bodyPr rtlCol="0" anchor="ctr"/>
-          <a:lstStyle/>
-          <a:p>
-            <a:pPr algn="ctr"/>
-            <a:r>
-              <a:rPr lang="en-US" sz="1200" dirty="0" smtClean="0"/>
-              <a:t>Sensor #3</a:t>
-            </a:r>
-            <a:endParaRPr lang="en-US" sz="1200" dirty="0"/>
-          </a:p>
-        </p:txBody>
-      </p:sp>
-      <p:sp>
-        <p:nvSpPr>
-          <p:cNvPr id="49" name="Rounded Rectangle 48"/>
-          <p:cNvSpPr/>
-          <p:nvPr/>
-        </p:nvSpPr>
-        <p:spPr>
-          <a:xfrm>
-            <a:off x="5007125" y="3461639"/>
-            <a:ext cx="2183298" cy="601103"/>
-          </a:xfrm>
-          <a:prstGeom prst="roundRect">
-            <a:avLst/>
-          </a:prstGeom>
-        </p:spPr>
-        <p:style>
-          <a:lnRef idx="2">
-            <a:schemeClr val="accent5">
-              <a:shade val="50000"/>
-            </a:schemeClr>
-          </a:lnRef>
-          <a:fillRef idx="1">
-            <a:schemeClr val="accent5"/>
-          </a:fillRef>
-          <a:effectRef idx="0">
-            <a:schemeClr val="accent5"/>
-          </a:effectRef>
-          <a:fontRef idx="minor">
-            <a:schemeClr val="lt1"/>
-          </a:fontRef>
-        </p:style>
-        <p:txBody>
-          <a:bodyPr rtlCol="0" anchor="ctr"/>
-          <a:lstStyle/>
-          <a:p>
-            <a:pPr algn="ctr"/>
-            <a:r>
-              <a:rPr lang="en-US" sz="1600" dirty="0" smtClean="0"/>
-              <a:t>Smart Instrument #2</a:t>
-            </a:r>
-            <a:endParaRPr lang="en-US" sz="1600" dirty="0"/>
-          </a:p>
-        </p:txBody>
-      </p:sp>
-      <p:sp>
-        <p:nvSpPr>
-          <p:cNvPr id="50" name="Rounded Rectangle 49"/>
-          <p:cNvSpPr/>
-          <p:nvPr/>
-        </p:nvSpPr>
-        <p:spPr>
-          <a:xfrm>
-            <a:off x="4970944" y="4884344"/>
-            <a:ext cx="880278" cy="578243"/>
-          </a:xfrm>
-          <a:prstGeom prst="roundRect">
-            <a:avLst/>
-          </a:prstGeom>
-        </p:spPr>
-        <p:style>
-          <a:lnRef idx="2">
-            <a:schemeClr val="dk1">
-              <a:shade val="50000"/>
-            </a:schemeClr>
-          </a:lnRef>
-          <a:fillRef idx="1">
-            <a:schemeClr val="dk1"/>
-          </a:fillRef>
-          <a:effectRef idx="0">
-            <a:schemeClr val="dk1"/>
-          </a:effectRef>
-          <a:fontRef idx="minor">
-            <a:schemeClr val="lt1"/>
-          </a:fontRef>
-        </p:style>
-        <p:txBody>
-          <a:bodyPr rtlCol="0" anchor="ctr"/>
-          <a:lstStyle/>
-          <a:p>
-            <a:pPr algn="ctr"/>
-            <a:r>
-              <a:rPr lang="en-US" sz="1200" dirty="0" smtClean="0"/>
-              <a:t>Sensor #4</a:t>
-            </a:r>
-            <a:endParaRPr lang="en-US" sz="1200" dirty="0"/>
-          </a:p>
-        </p:txBody>
-      </p:sp>
-      <p:sp>
-        <p:nvSpPr>
-          <p:cNvPr id="51" name="Rounded Rectangle 50"/>
-          <p:cNvSpPr/>
-          <p:nvPr/>
-        </p:nvSpPr>
-        <p:spPr>
-          <a:xfrm>
-            <a:off x="5655861" y="5842685"/>
-            <a:ext cx="880278" cy="578243"/>
-          </a:xfrm>
-          <a:prstGeom prst="roundRect">
-            <a:avLst/>
-          </a:prstGeom>
-        </p:spPr>
-        <p:style>
-          <a:lnRef idx="2">
-            <a:schemeClr val="dk1">
-              <a:shade val="50000"/>
-            </a:schemeClr>
-          </a:lnRef>
-          <a:fillRef idx="1">
-            <a:schemeClr val="dk1"/>
-          </a:fillRef>
-          <a:effectRef idx="0">
-            <a:schemeClr val="dk1"/>
-          </a:effectRef>
-          <a:fontRef idx="minor">
-            <a:schemeClr val="lt1"/>
-          </a:fontRef>
-        </p:style>
-        <p:txBody>
-          <a:bodyPr rtlCol="0" anchor="ctr"/>
-          <a:lstStyle/>
-          <a:p>
-            <a:pPr algn="ctr"/>
-            <a:r>
-              <a:rPr lang="en-US" sz="1200" dirty="0" smtClean="0"/>
-              <a:t>Sensor #5</a:t>
-            </a:r>
-            <a:endParaRPr lang="en-US" sz="1200" dirty="0"/>
-          </a:p>
-        </p:txBody>
-      </p:sp>
-      <p:sp>
-        <p:nvSpPr>
-          <p:cNvPr id="52" name="Rounded Rectangle 51"/>
-          <p:cNvSpPr/>
-          <p:nvPr/>
-        </p:nvSpPr>
-        <p:spPr>
-          <a:xfrm>
-            <a:off x="6416267" y="4750163"/>
-            <a:ext cx="880278" cy="578243"/>
-          </a:xfrm>
-          <a:prstGeom prst="roundRect">
-            <a:avLst/>
-          </a:prstGeom>
-        </p:spPr>
-        <p:style>
-          <a:lnRef idx="2">
-            <a:schemeClr val="dk1">
-              <a:shade val="50000"/>
-            </a:schemeClr>
-          </a:lnRef>
-          <a:fillRef idx="1">
-            <a:schemeClr val="dk1"/>
-          </a:fillRef>
-          <a:effectRef idx="0">
-            <a:schemeClr val="dk1"/>
-          </a:effectRef>
-          <a:fontRef idx="minor">
-            <a:schemeClr val="lt1"/>
-          </a:fontRef>
-        </p:style>
-        <p:txBody>
-          <a:bodyPr rtlCol="0" anchor="ctr"/>
-          <a:lstStyle/>
-          <a:p>
-            <a:pPr algn="ctr"/>
-            <a:r>
-              <a:rPr lang="en-US" sz="1200" dirty="0" smtClean="0"/>
-              <a:t>Sensor #6</a:t>
-            </a:r>
-            <a:endParaRPr lang="en-US" sz="1200" dirty="0"/>
-          </a:p>
-        </p:txBody>
-      </p:sp>
-      <p:sp>
-        <p:nvSpPr>
-          <p:cNvPr id="64" name="Rounded Rectangle 63"/>
-          <p:cNvSpPr/>
-          <p:nvPr/>
-        </p:nvSpPr>
-        <p:spPr>
-          <a:xfrm>
-            <a:off x="6674084" y="5648287"/>
-            <a:ext cx="880278" cy="578243"/>
-          </a:xfrm>
-          <a:prstGeom prst="roundRect">
-            <a:avLst/>
-          </a:prstGeom>
-        </p:spPr>
-        <p:style>
-          <a:lnRef idx="2">
-            <a:schemeClr val="dk1">
-              <a:shade val="50000"/>
-            </a:schemeClr>
-          </a:lnRef>
-          <a:fillRef idx="1">
-            <a:schemeClr val="dk1"/>
-          </a:fillRef>
-          <a:effectRef idx="0">
-            <a:schemeClr val="dk1"/>
-          </a:effectRef>
-          <a:fontRef idx="minor">
-            <a:schemeClr val="lt1"/>
-          </a:fontRef>
-        </p:style>
-        <p:txBody>
-          <a:bodyPr rtlCol="0" anchor="ctr"/>
-          <a:lstStyle/>
-          <a:p>
-            <a:pPr algn="ctr"/>
-            <a:r>
-              <a:rPr lang="en-US" sz="1200" dirty="0" smtClean="0"/>
-              <a:t>Sensor #7</a:t>
-            </a:r>
-            <a:endParaRPr lang="en-US" sz="1200" dirty="0"/>
-          </a:p>
-        </p:txBody>
-      </p:sp>
-      <p:cxnSp>
-        <p:nvCxnSpPr>
-          <p:cNvPr id="91" name="Elbow Connector 90"/>
-          <p:cNvCxnSpPr>
-            <a:stCxn id="5" idx="2"/>
-            <a:endCxn id="24" idx="0"/>
-          </p:cNvCxnSpPr>
-          <p:nvPr/>
-        </p:nvCxnSpPr>
-        <p:spPr>
-          <a:xfrm rot="5400000">
-            <a:off x="2337085" y="4129698"/>
-            <a:ext cx="821602" cy="687691"/>
-          </a:xfrm>
-          <a:prstGeom prst="bentConnector3">
-            <a:avLst>
-              <a:gd name="adj1" fmla="val 50000"/>
-            </a:avLst>
-          </a:prstGeom>
-          <a:ln w="28575">
-            <a:solidFill>
-              <a:schemeClr val="tx1"/>
-            </a:solidFill>
-            <a:headEnd type="triangle"/>
-            <a:tailEnd type="triangle"/>
-          </a:ln>
-        </p:spPr>
-        <p:style>
-          <a:lnRef idx="1">
-            <a:schemeClr val="accent1"/>
-          </a:lnRef>
-          <a:fillRef idx="0">
-            <a:schemeClr val="accent1"/>
-          </a:fillRef>
-          <a:effectRef idx="0">
-            <a:schemeClr val="accent1"/>
-          </a:effectRef>
-          <a:fontRef idx="minor">
-            <a:schemeClr val="tx1"/>
-          </a:fontRef>
-        </p:style>
-      </p:cxnSp>
-      <p:cxnSp>
-        <p:nvCxnSpPr>
-          <p:cNvPr id="94" name="Elbow Connector 93"/>
-          <p:cNvCxnSpPr>
-            <a:stCxn id="5" idx="2"/>
-            <a:endCxn id="32" idx="0"/>
-          </p:cNvCxnSpPr>
-          <p:nvPr/>
-        </p:nvCxnSpPr>
-        <p:spPr>
-          <a:xfrm rot="16200000" flipH="1">
-            <a:off x="3126837" y="4027636"/>
-            <a:ext cx="687421" cy="757632"/>
-          </a:xfrm>
-          <a:prstGeom prst="bentConnector3">
-            <a:avLst>
-              <a:gd name="adj1" fmla="val 50000"/>
-            </a:avLst>
-          </a:prstGeom>
-          <a:ln w="28575">
-            <a:solidFill>
-              <a:schemeClr val="tx1"/>
-            </a:solidFill>
-            <a:headEnd type="triangle"/>
-            <a:tailEnd type="triangle"/>
-          </a:ln>
-        </p:spPr>
-        <p:style>
-          <a:lnRef idx="1">
-            <a:schemeClr val="accent1"/>
-          </a:lnRef>
-          <a:fillRef idx="0">
-            <a:schemeClr val="accent1"/>
-          </a:fillRef>
-          <a:effectRef idx="0">
-            <a:schemeClr val="accent1"/>
-          </a:effectRef>
-          <a:fontRef idx="minor">
-            <a:schemeClr val="tx1"/>
-          </a:fontRef>
-        </p:style>
-      </p:cxnSp>
-      <p:cxnSp>
-        <p:nvCxnSpPr>
-          <p:cNvPr id="97" name="Elbow Connector 96"/>
-          <p:cNvCxnSpPr>
-            <a:stCxn id="49" idx="2"/>
-            <a:endCxn id="64" idx="0"/>
-          </p:cNvCxnSpPr>
-          <p:nvPr/>
-        </p:nvCxnSpPr>
-        <p:spPr>
-          <a:xfrm rot="16200000" flipH="1">
-            <a:off x="5813726" y="4347789"/>
-            <a:ext cx="1585545" cy="1015449"/>
-          </a:xfrm>
-          <a:prstGeom prst="bentConnector3">
-            <a:avLst>
-              <a:gd name="adj1" fmla="val 85644"/>
-            </a:avLst>
-          </a:prstGeom>
-          <a:ln w="28575">
-            <a:solidFill>
-              <a:schemeClr val="tx1"/>
-            </a:solidFill>
-            <a:headEnd type="triangle"/>
-            <a:tailEnd type="triangle"/>
-          </a:ln>
-        </p:spPr>
-        <p:style>
-          <a:lnRef idx="1">
-            <a:schemeClr val="accent1"/>
-          </a:lnRef>
-          <a:fillRef idx="0">
-            <a:schemeClr val="accent1"/>
-          </a:fillRef>
-          <a:effectRef idx="0">
-            <a:schemeClr val="accent1"/>
-          </a:effectRef>
-          <a:fontRef idx="minor">
-            <a:schemeClr val="tx1"/>
-          </a:fontRef>
-        </p:style>
-      </p:cxnSp>
-      <p:cxnSp>
-        <p:nvCxnSpPr>
-          <p:cNvPr id="98" name="Elbow Connector 97"/>
-          <p:cNvCxnSpPr>
-            <a:stCxn id="49" idx="2"/>
-            <a:endCxn id="52" idx="0"/>
-          </p:cNvCxnSpPr>
-          <p:nvPr/>
-        </p:nvCxnSpPr>
-        <p:spPr>
-          <a:xfrm rot="16200000" flipH="1">
-            <a:off x="6133880" y="4027636"/>
-            <a:ext cx="687421" cy="757632"/>
-          </a:xfrm>
-          <a:prstGeom prst="bentConnector3">
-            <a:avLst>
-              <a:gd name="adj1" fmla="val 50000"/>
-            </a:avLst>
-          </a:prstGeom>
-          <a:ln w="28575">
-            <a:solidFill>
-              <a:schemeClr val="tx1"/>
-            </a:solidFill>
-            <a:headEnd type="triangle"/>
-            <a:tailEnd type="triangle"/>
-          </a:ln>
-        </p:spPr>
-        <p:style>
-          <a:lnRef idx="1">
-            <a:schemeClr val="accent1"/>
-          </a:lnRef>
-          <a:fillRef idx="0">
-            <a:schemeClr val="accent1"/>
-          </a:fillRef>
-          <a:effectRef idx="0">
-            <a:schemeClr val="accent1"/>
-          </a:effectRef>
-          <a:fontRef idx="minor">
-            <a:schemeClr val="tx1"/>
-          </a:fontRef>
-        </p:style>
-      </p:cxnSp>
-      <p:cxnSp>
-        <p:nvCxnSpPr>
-          <p:cNvPr id="99" name="Elbow Connector 98"/>
-          <p:cNvCxnSpPr>
-            <a:stCxn id="49" idx="2"/>
-            <a:endCxn id="50" idx="0"/>
-          </p:cNvCxnSpPr>
-          <p:nvPr/>
-        </p:nvCxnSpPr>
-        <p:spPr>
-          <a:xfrm rot="5400000">
-            <a:off x="5344128" y="4129698"/>
-            <a:ext cx="821602" cy="687691"/>
-          </a:xfrm>
-          <a:prstGeom prst="bentConnector3">
-            <a:avLst>
-              <a:gd name="adj1" fmla="val 50000"/>
-            </a:avLst>
-          </a:prstGeom>
-          <a:ln w="28575">
-            <a:solidFill>
-              <a:schemeClr val="tx1"/>
-            </a:solidFill>
-            <a:headEnd type="triangle"/>
-            <a:tailEnd type="triangle"/>
-          </a:ln>
-        </p:spPr>
-        <p:style>
-          <a:lnRef idx="1">
-            <a:schemeClr val="accent1"/>
-          </a:lnRef>
-          <a:fillRef idx="0">
-            <a:schemeClr val="accent1"/>
-          </a:fillRef>
-          <a:effectRef idx="0">
-            <a:schemeClr val="accent1"/>
-          </a:effectRef>
-          <a:fontRef idx="minor">
-            <a:schemeClr val="tx1"/>
-          </a:fontRef>
-        </p:style>
-      </p:cxnSp>
-      <p:cxnSp>
-        <p:nvCxnSpPr>
-          <p:cNvPr id="100" name="Elbow Connector 99"/>
-          <p:cNvCxnSpPr>
-            <a:stCxn id="4" idx="2"/>
-            <a:endCxn id="5" idx="0"/>
-          </p:cNvCxnSpPr>
-          <p:nvPr/>
-        </p:nvCxnSpPr>
-        <p:spPr>
-          <a:xfrm rot="5400000">
-            <a:off x="3975701" y="1341340"/>
-            <a:ext cx="1236330" cy="3004269"/>
-          </a:xfrm>
-          <a:prstGeom prst="bentConnector3">
-            <a:avLst>
-              <a:gd name="adj1" fmla="val 50000"/>
-            </a:avLst>
-          </a:prstGeom>
-          <a:ln w="28575">
-            <a:solidFill>
-              <a:schemeClr val="tx1"/>
-            </a:solidFill>
-            <a:headEnd type="triangle"/>
-            <a:tailEnd type="triangle"/>
-          </a:ln>
-        </p:spPr>
-        <p:style>
-          <a:lnRef idx="1">
-            <a:schemeClr val="accent1"/>
-          </a:lnRef>
-          <a:fillRef idx="0">
-            <a:schemeClr val="accent1"/>
-          </a:fillRef>
-          <a:effectRef idx="0">
-            <a:schemeClr val="accent1"/>
-          </a:effectRef>
-          <a:fontRef idx="minor">
-            <a:schemeClr val="tx1"/>
-          </a:fontRef>
-        </p:style>
-      </p:cxnSp>
-      <p:cxnSp>
-        <p:nvCxnSpPr>
-          <p:cNvPr id="111" name="Straight Arrow Connector 110"/>
-          <p:cNvCxnSpPr>
-            <a:stCxn id="4" idx="2"/>
-            <a:endCxn id="49" idx="0"/>
-          </p:cNvCxnSpPr>
-          <p:nvPr/>
-        </p:nvCxnSpPr>
-        <p:spPr>
-          <a:xfrm>
-            <a:off x="6096000" y="2225309"/>
-            <a:ext cx="2774" cy="1236330"/>
-          </a:xfrm>
-          <a:prstGeom prst="straightConnector1">
-            <a:avLst/>
-          </a:prstGeom>
-          <a:ln w="28575">
-            <a:solidFill>
-              <a:schemeClr val="tx1"/>
-            </a:solidFill>
-            <a:headEnd type="triangle"/>
-            <a:tailEnd type="triangle"/>
-          </a:ln>
-        </p:spPr>
-        <p:style>
-          <a:lnRef idx="1">
-            <a:schemeClr val="accent1"/>
-          </a:lnRef>
-          <a:fillRef idx="0">
-            <a:schemeClr val="accent1"/>
-          </a:fillRef>
-          <a:effectRef idx="0">
-            <a:schemeClr val="accent1"/>
-          </a:effectRef>
-          <a:fontRef idx="minor">
-            <a:schemeClr val="tx1"/>
-          </a:fontRef>
-        </p:style>
-      </p:cxnSp>
-      <p:cxnSp>
-        <p:nvCxnSpPr>
-          <p:cNvPr id="112" name="Straight Arrow Connector 111"/>
-          <p:cNvCxnSpPr>
-            <a:stCxn id="5" idx="2"/>
-            <a:endCxn id="31" idx="0"/>
-          </p:cNvCxnSpPr>
-          <p:nvPr/>
-        </p:nvCxnSpPr>
-        <p:spPr>
-          <a:xfrm>
-            <a:off x="3091731" y="4062742"/>
-            <a:ext cx="0" cy="1585546"/>
-          </a:xfrm>
-          <a:prstGeom prst="straightConnector1">
-            <a:avLst/>
-          </a:prstGeom>
-          <a:ln w="28575">
-            <a:solidFill>
-              <a:schemeClr val="tx1"/>
-            </a:solidFill>
-            <a:headEnd type="triangle"/>
-            <a:tailEnd type="triangle"/>
-          </a:ln>
-        </p:spPr>
-        <p:style>
-          <a:lnRef idx="1">
-            <a:schemeClr val="accent1"/>
-          </a:lnRef>
-          <a:fillRef idx="0">
-            <a:schemeClr val="accent1"/>
-          </a:fillRef>
-          <a:effectRef idx="0">
-            <a:schemeClr val="accent1"/>
-          </a:effectRef>
-          <a:fontRef idx="minor">
-            <a:schemeClr val="tx1"/>
-          </a:fontRef>
-        </p:style>
-      </p:cxnSp>
-      <p:cxnSp>
-        <p:nvCxnSpPr>
-          <p:cNvPr id="113" name="Straight Arrow Connector 112"/>
-          <p:cNvCxnSpPr>
-            <a:stCxn id="49" idx="2"/>
-            <a:endCxn id="51" idx="0"/>
-          </p:cNvCxnSpPr>
-          <p:nvPr/>
-        </p:nvCxnSpPr>
-        <p:spPr>
-          <a:xfrm flipH="1">
-            <a:off x="6096000" y="4062742"/>
-            <a:ext cx="2774" cy="1779943"/>
-          </a:xfrm>
-          <a:prstGeom prst="straightConnector1">
-            <a:avLst/>
-          </a:prstGeom>
-          <a:ln w="28575">
-            <a:solidFill>
-              <a:schemeClr val="tx1"/>
-            </a:solidFill>
-            <a:headEnd type="triangle"/>
-            <a:tailEnd type="triangle"/>
-          </a:ln>
-        </p:spPr>
-        <p:style>
-          <a:lnRef idx="1">
-            <a:schemeClr val="accent1"/>
-          </a:lnRef>
-          <a:fillRef idx="0">
-            <a:schemeClr val="accent1"/>
-          </a:fillRef>
-          <a:effectRef idx="0">
-            <a:schemeClr val="accent1"/>
-          </a:effectRef>
-          <a:fontRef idx="minor">
-            <a:schemeClr val="tx1"/>
-          </a:fontRef>
-        </p:style>
-      </p:cxnSp>
-      <p:sp>
-        <p:nvSpPr>
-          <p:cNvPr id="48" name="Oval 47"/>
-          <p:cNvSpPr/>
-          <p:nvPr/>
-        </p:nvSpPr>
-        <p:spPr>
-          <a:xfrm>
-            <a:off x="2802805" y="4257140"/>
-            <a:ext cx="577850" cy="375146"/>
-          </a:xfrm>
-          <a:prstGeom prst="ellipse">
-            <a:avLst/>
-          </a:prstGeom>
-        </p:spPr>
-        <p:style>
-          <a:lnRef idx="2">
-            <a:schemeClr val="dk1"/>
-          </a:lnRef>
-          <a:fillRef idx="1">
-            <a:schemeClr val="lt1"/>
-          </a:fillRef>
-          <a:effectRef idx="0">
-            <a:schemeClr val="dk1"/>
-          </a:effectRef>
-          <a:fontRef idx="minor">
-            <a:schemeClr val="dk1"/>
-          </a:fontRef>
-        </p:style>
-        <p:txBody>
-          <a:bodyPr rtlCol="0" anchor="ctr"/>
-          <a:lstStyle/>
-          <a:p>
-            <a:pPr algn="ctr"/>
-            <a:r>
-              <a:rPr lang="en-US" sz="1200" dirty="0" smtClean="0"/>
-              <a:t>I</a:t>
-            </a:r>
-            <a:r>
-              <a:rPr lang="en-US" sz="1200" baseline="30000" dirty="0" smtClean="0"/>
-              <a:t>2</a:t>
-            </a:r>
-            <a:r>
-              <a:rPr lang="en-US" sz="1200" dirty="0" smtClean="0"/>
-              <a:t>C</a:t>
-            </a:r>
-            <a:endParaRPr lang="en-US" sz="1200" dirty="0"/>
-          </a:p>
-        </p:txBody>
-      </p:sp>
-      <p:sp>
-        <p:nvSpPr>
-          <p:cNvPr id="78" name="Oval 77"/>
-          <p:cNvSpPr/>
-          <p:nvPr/>
-        </p:nvSpPr>
-        <p:spPr>
-          <a:xfrm>
-            <a:off x="5533699" y="2600110"/>
-            <a:ext cx="1140385" cy="477158"/>
-          </a:xfrm>
-          <a:prstGeom prst="ellipse">
-            <a:avLst/>
-          </a:prstGeom>
-        </p:spPr>
-        <p:style>
-          <a:lnRef idx="2">
-            <a:schemeClr val="dk1"/>
-          </a:lnRef>
-          <a:fillRef idx="1">
-            <a:schemeClr val="lt1"/>
-          </a:fillRef>
-          <a:effectRef idx="0">
-            <a:schemeClr val="dk1"/>
-          </a:effectRef>
-          <a:fontRef idx="minor">
-            <a:schemeClr val="dk1"/>
-          </a:fontRef>
-        </p:style>
-        <p:txBody>
-          <a:bodyPr rtlCol="0" anchor="ctr"/>
-          <a:lstStyle/>
-          <a:p>
-            <a:pPr algn="ctr"/>
-            <a:r>
-              <a:rPr lang="en-US" sz="1200" dirty="0" smtClean="0"/>
-              <a:t>Bluetooth</a:t>
-            </a:r>
-            <a:endParaRPr lang="en-US" sz="1200" dirty="0"/>
-          </a:p>
-        </p:txBody>
-      </p:sp>
-      <p:sp>
-        <p:nvSpPr>
-          <p:cNvPr id="56" name="Oval 55"/>
-          <p:cNvSpPr/>
-          <p:nvPr/>
-        </p:nvSpPr>
-        <p:spPr>
-          <a:xfrm>
-            <a:off x="5809848" y="4257140"/>
-            <a:ext cx="577850" cy="375146"/>
-          </a:xfrm>
-          <a:prstGeom prst="ellipse">
-            <a:avLst/>
-          </a:prstGeom>
-        </p:spPr>
-        <p:style>
-          <a:lnRef idx="2">
-            <a:schemeClr val="dk1"/>
-          </a:lnRef>
-          <a:fillRef idx="1">
-            <a:schemeClr val="lt1"/>
-          </a:fillRef>
-          <a:effectRef idx="0">
-            <a:schemeClr val="dk1"/>
-          </a:effectRef>
-          <a:fontRef idx="minor">
-            <a:schemeClr val="dk1"/>
-          </a:fontRef>
-        </p:style>
-        <p:txBody>
-          <a:bodyPr rtlCol="0" anchor="ctr"/>
-          <a:lstStyle/>
-          <a:p>
-            <a:pPr algn="ctr"/>
-            <a:r>
-              <a:rPr lang="en-US" sz="1200" dirty="0" smtClean="0"/>
-              <a:t>I</a:t>
-            </a:r>
-            <a:r>
-              <a:rPr lang="en-US" sz="1200" baseline="30000" dirty="0" smtClean="0"/>
-              <a:t>2</a:t>
-            </a:r>
-            <a:r>
-              <a:rPr lang="en-US" sz="1200" dirty="0" smtClean="0"/>
-              <a:t>C</a:t>
-            </a:r>
-            <a:endParaRPr lang="en-US" sz="1200" dirty="0"/>
-          </a:p>
-        </p:txBody>
-      </p:sp>
     </p:spTree>
     <p:extLst>
       <p:ext uri="{BB962C8B-B14F-4D97-AF65-F5344CB8AC3E}">

</xml_diff>